<commit_message>
Creacion de tablas de comparacion
</commit_message>
<xml_diff>
--- a/docs/descripcion_regresion.pptx
+++ b/docs/descripcion_regresion.pptx
@@ -12,6 +12,8 @@
     <p:sldId id="260" r:id="rId6"/>
     <p:sldId id="261" r:id="rId7"/>
     <p:sldId id="262" r:id="rId8"/>
+    <p:sldId id="263" r:id="rId9"/>
+    <p:sldId id="264" r:id="rId10"/>
   </p:sldIdLst>
   <p:sldSz cx="12192000" cy="6858000"/>
   <p:notesSz cx="6858000" cy="9144000"/>
@@ -4026,7 +4028,7 @@
               <a:buNone/>
             </a:pPr>
             <a:r>
-              <a:rPr lang="es-MX"/>
+              <a:rPr lang="es-MX" dirty="0"/>
               <a:t>Incluir barritas</a:t>
             </a:r>
           </a:p>
@@ -4039,6 +4041,211 @@
     <p:extLst>
       <p:ext uri="{BB962C8B-B14F-4D97-AF65-F5344CB8AC3E}">
         <p14:creationId xmlns:p14="http://schemas.microsoft.com/office/powerpoint/2010/main" val="1728773293"/>
+      </p:ext>
+    </p:extLst>
+  </p:cSld>
+  <p:clrMapOvr>
+    <a:masterClrMapping/>
+  </p:clrMapOvr>
+</p:sld>
+</file>
+
+<file path=ppt/slides/slide8.xml><?xml version="1.0" encoding="utf-8"?>
+<p:sld xmlns:a="http://schemas.openxmlformats.org/drawingml/2006/main" xmlns:r="http://schemas.openxmlformats.org/officeDocument/2006/relationships" xmlns:p="http://schemas.openxmlformats.org/presentationml/2006/main">
+  <p:cSld>
+    <p:spTree>
+      <p:nvGrpSpPr>
+        <p:cNvPr id="1" name=""/>
+        <p:cNvGrpSpPr/>
+        <p:nvPr/>
+      </p:nvGrpSpPr>
+      <p:grpSpPr>
+        <a:xfrm>
+          <a:off x="0" y="0"/>
+          <a:ext cx="0" cy="0"/>
+          <a:chOff x="0" y="0"/>
+          <a:chExt cx="0" cy="0"/>
+        </a:xfrm>
+      </p:grpSpPr>
+      <p:sp>
+        <p:nvSpPr>
+          <p:cNvPr id="2" name="Título 1">
+            <a:extLst>
+              <a:ext uri="{FF2B5EF4-FFF2-40B4-BE49-F238E27FC236}">
+                <a16:creationId xmlns:a16="http://schemas.microsoft.com/office/drawing/2014/main" id="{FC7134A7-7323-43A2-AC5C-8AA9AE79F66F}"/>
+              </a:ext>
+            </a:extLst>
+          </p:cNvPr>
+          <p:cNvSpPr>
+            <a:spLocks noGrp="1"/>
+          </p:cNvSpPr>
+          <p:nvPr>
+            <p:ph type="title"/>
+          </p:nvPr>
+        </p:nvSpPr>
+        <p:spPr/>
+        <p:txBody>
+          <a:bodyPr/>
+          <a:lstStyle/>
+          <a:p>
+            <a:endParaRPr lang="es-MX"/>
+          </a:p>
+        </p:txBody>
+      </p:sp>
+      <p:sp>
+        <p:nvSpPr>
+          <p:cNvPr id="3" name="Marcador de contenido 2">
+            <a:extLst>
+              <a:ext uri="{FF2B5EF4-FFF2-40B4-BE49-F238E27FC236}">
+                <a16:creationId xmlns:a16="http://schemas.microsoft.com/office/drawing/2014/main" id="{1C644DAA-73E7-4DC1-8DB5-59A032762E03}"/>
+              </a:ext>
+            </a:extLst>
+          </p:cNvPr>
+          <p:cNvSpPr>
+            <a:spLocks noGrp="1"/>
+          </p:cNvSpPr>
+          <p:nvPr>
+            <p:ph idx="1"/>
+          </p:nvPr>
+        </p:nvSpPr>
+        <p:spPr/>
+        <p:txBody>
+          <a:bodyPr/>
+          <a:lstStyle/>
+          <a:p>
+            <a:r>
+              <a:rPr lang="es-MX" dirty="0"/>
+              <a:t>Además de realizar el análisis con una regresión </a:t>
+            </a:r>
+            <a:r>
+              <a:rPr lang="es-MX" dirty="0" err="1"/>
+              <a:t>multilogit</a:t>
+            </a:r>
+            <a:r>
+              <a:rPr lang="es-MX" dirty="0"/>
+              <a:t>, se analizaron otros métodos clásicos de aprendizaje supervisado, para ver si se podría obtener una mejor respuesta.</a:t>
+            </a:r>
+          </a:p>
+          <a:p>
+            <a:r>
+              <a:rPr lang="es-MX" dirty="0"/>
+              <a:t>Se aplicó una SVM (Máquina de Soporte Vectorial) a los datos obteniendo estos resultados:</a:t>
+            </a:r>
+          </a:p>
+          <a:p>
+            <a:pPr marL="0" indent="0">
+              <a:buNone/>
+            </a:pPr>
+            <a:r>
+              <a:rPr lang="es-MX" dirty="0"/>
+              <a:t>Incluir como matriz de confusión y la tabla de métricas</a:t>
+            </a:r>
+          </a:p>
+        </p:txBody>
+      </p:sp>
+    </p:spTree>
+    <p:extLst>
+      <p:ext uri="{BB962C8B-B14F-4D97-AF65-F5344CB8AC3E}">
+        <p14:creationId xmlns:p14="http://schemas.microsoft.com/office/powerpoint/2010/main" val="1200753648"/>
+      </p:ext>
+    </p:extLst>
+  </p:cSld>
+  <p:clrMapOvr>
+    <a:masterClrMapping/>
+  </p:clrMapOvr>
+</p:sld>
+</file>
+
+<file path=ppt/slides/slide9.xml><?xml version="1.0" encoding="utf-8"?>
+<p:sld xmlns:a="http://schemas.openxmlformats.org/drawingml/2006/main" xmlns:r="http://schemas.openxmlformats.org/officeDocument/2006/relationships" xmlns:p="http://schemas.openxmlformats.org/presentationml/2006/main">
+  <p:cSld>
+    <p:spTree>
+      <p:nvGrpSpPr>
+        <p:cNvPr id="1" name=""/>
+        <p:cNvGrpSpPr/>
+        <p:nvPr/>
+      </p:nvGrpSpPr>
+      <p:grpSpPr>
+        <a:xfrm>
+          <a:off x="0" y="0"/>
+          <a:ext cx="0" cy="0"/>
+          <a:chOff x="0" y="0"/>
+          <a:chExt cx="0" cy="0"/>
+        </a:xfrm>
+      </p:grpSpPr>
+      <p:sp>
+        <p:nvSpPr>
+          <p:cNvPr id="2" name="Título 1">
+            <a:extLst>
+              <a:ext uri="{FF2B5EF4-FFF2-40B4-BE49-F238E27FC236}">
+                <a16:creationId xmlns:a16="http://schemas.microsoft.com/office/drawing/2014/main" id="{3654E8D2-118D-49CF-909B-D13ADEE2BF37}"/>
+              </a:ext>
+            </a:extLst>
+          </p:cNvPr>
+          <p:cNvSpPr>
+            <a:spLocks noGrp="1"/>
+          </p:cNvSpPr>
+          <p:nvPr>
+            <p:ph type="title"/>
+          </p:nvPr>
+        </p:nvSpPr>
+        <p:spPr/>
+        <p:txBody>
+          <a:bodyPr/>
+          <a:lstStyle/>
+          <a:p>
+            <a:endParaRPr lang="es-MX"/>
+          </a:p>
+        </p:txBody>
+      </p:sp>
+      <p:sp>
+        <p:nvSpPr>
+          <p:cNvPr id="3" name="Marcador de contenido 2">
+            <a:extLst>
+              <a:ext uri="{FF2B5EF4-FFF2-40B4-BE49-F238E27FC236}">
+                <a16:creationId xmlns:a16="http://schemas.microsoft.com/office/drawing/2014/main" id="{D502125B-5184-47B0-8ABF-7797543F866B}"/>
+              </a:ext>
+            </a:extLst>
+          </p:cNvPr>
+          <p:cNvSpPr>
+            <a:spLocks noGrp="1"/>
+          </p:cNvSpPr>
+          <p:nvPr>
+            <p:ph idx="1"/>
+          </p:nvPr>
+        </p:nvSpPr>
+        <p:spPr/>
+        <p:txBody>
+          <a:bodyPr/>
+          <a:lstStyle/>
+          <a:p>
+            <a:r>
+              <a:rPr lang="es-MX" dirty="0"/>
+              <a:t>Aunque no es un resultado esperado, si podemos obtener mejores resultados que utilizando una simple regresión.</a:t>
+            </a:r>
+          </a:p>
+          <a:p>
+            <a:r>
+              <a:rPr lang="es-MX" dirty="0"/>
+              <a:t>También aplicamos una Red Neuronal simple a los datos, pero en este caso, no se obtuvieron buenas predicciones.</a:t>
+            </a:r>
+          </a:p>
+          <a:p>
+            <a:pPr marL="0" indent="0">
+              <a:buNone/>
+            </a:pPr>
+            <a:r>
+              <a:rPr lang="es-MX"/>
+              <a:t>Agregar tabla de la red</a:t>
+            </a:r>
+            <a:endParaRPr lang="es-MX" dirty="0"/>
+          </a:p>
+        </p:txBody>
+      </p:sp>
+    </p:spTree>
+    <p:extLst>
+      <p:ext uri="{BB962C8B-B14F-4D97-AF65-F5344CB8AC3E}">
+        <p14:creationId xmlns:p14="http://schemas.microsoft.com/office/powerpoint/2010/main" val="4110364141"/>
       </p:ext>
     </p:extLst>
   </p:cSld>

</xml_diff>